<commit_message>
Update of PowerPoint presentation
</commit_message>
<xml_diff>
--- a/Run&Kill.pptx
+++ b/Run&Kill.pptx
@@ -4085,6 +4085,134 @@
           </a:p>
         </p:txBody>
       </p:sp>
+      <p:pic>
+        <p:nvPicPr>
+          <p:cNvPr id="1028" name="Picture 4">
+            <a:extLst>
+              <a:ext uri="{FF2B5EF4-FFF2-40B4-BE49-F238E27FC236}">
+                <a16:creationId xmlns:a16="http://schemas.microsoft.com/office/drawing/2014/main" id="{66AE5B7D-3D8A-92BE-93FA-2D2FE267E84C}"/>
+              </a:ext>
+            </a:extLst>
+          </p:cNvPr>
+          <p:cNvPicPr>
+            <a:picLocks noChangeAspect="1" noChangeArrowheads="1"/>
+          </p:cNvPicPr>
+          <p:nvPr/>
+        </p:nvPicPr>
+        <p:blipFill>
+          <a:blip r:embed="rId2" cstate="print">
+            <a:extLst>
+              <a:ext uri="{28A0092B-C50C-407E-A947-70E740481C1C}">
+                <a14:useLocalDpi xmlns:a14="http://schemas.microsoft.com/office/drawing/2010/main" val="0"/>
+              </a:ext>
+            </a:extLst>
+          </a:blip>
+          <a:srcRect/>
+          <a:stretch>
+            <a:fillRect/>
+          </a:stretch>
+        </p:blipFill>
+        <p:spPr bwMode="auto">
+          <a:xfrm>
+            <a:off x="9358858" y="2714495"/>
+            <a:ext cx="1395664" cy="1531827"/>
+          </a:xfrm>
+          <a:prstGeom prst="rect">
+            <a:avLst/>
+          </a:prstGeom>
+          <a:noFill/>
+          <a:extLst>
+            <a:ext uri="{909E8E84-426E-40DD-AFC4-6F175D3DCCD1}">
+              <a14:hiddenFill xmlns:a14="http://schemas.microsoft.com/office/drawing/2010/main">
+                <a:solidFill>
+                  <a:srgbClr val="FFFFFF"/>
+                </a:solidFill>
+              </a14:hiddenFill>
+            </a:ext>
+          </a:extLst>
+        </p:spPr>
+      </p:pic>
+      <p:pic>
+        <p:nvPicPr>
+          <p:cNvPr id="1030" name="Picture 6">
+            <a:extLst>
+              <a:ext uri="{FF2B5EF4-FFF2-40B4-BE49-F238E27FC236}">
+                <a16:creationId xmlns:a16="http://schemas.microsoft.com/office/drawing/2014/main" id="{B6BCF2CA-120E-F608-F581-3E78C2E88191}"/>
+              </a:ext>
+            </a:extLst>
+          </p:cNvPr>
+          <p:cNvPicPr>
+            <a:picLocks noChangeAspect="1" noChangeArrowheads="1"/>
+          </p:cNvPicPr>
+          <p:nvPr/>
+        </p:nvPicPr>
+        <p:blipFill>
+          <a:blip r:embed="rId3" cstate="print">
+            <a:extLst>
+              <a:ext uri="{28A0092B-C50C-407E-A947-70E740481C1C}">
+                <a14:useLocalDpi xmlns:a14="http://schemas.microsoft.com/office/drawing/2010/main" val="0"/>
+              </a:ext>
+            </a:extLst>
+          </a:blip>
+          <a:srcRect/>
+          <a:stretch/>
+        </p:blipFill>
+        <p:spPr bwMode="auto">
+          <a:xfrm>
+            <a:off x="8716340" y="4773773"/>
+            <a:ext cx="2680699" cy="1061006"/>
+          </a:xfrm>
+          <a:prstGeom prst="rect">
+            <a:avLst/>
+          </a:prstGeom>
+          <a:noFill/>
+          <a:extLst>
+            <a:ext uri="{909E8E84-426E-40DD-AFC4-6F175D3DCCD1}">
+              <a14:hiddenFill xmlns:a14="http://schemas.microsoft.com/office/drawing/2010/main">
+                <a:solidFill>
+                  <a:srgbClr val="FFFFFF"/>
+                </a:solidFill>
+              </a14:hiddenFill>
+            </a:ext>
+          </a:extLst>
+        </p:spPr>
+      </p:pic>
+      <p:pic>
+        <p:nvPicPr>
+          <p:cNvPr id="6" name="Picture 5">
+            <a:extLst>
+              <a:ext uri="{FF2B5EF4-FFF2-40B4-BE49-F238E27FC236}">
+                <a16:creationId xmlns:a16="http://schemas.microsoft.com/office/drawing/2014/main" id="{39995E80-37DA-B78B-7337-1020F7BA20B7}"/>
+              </a:ext>
+            </a:extLst>
+          </p:cNvPr>
+          <p:cNvPicPr>
+            <a:picLocks noChangeAspect="1"/>
+          </p:cNvPicPr>
+          <p:nvPr/>
+        </p:nvPicPr>
+        <p:blipFill>
+          <a:blip r:embed="rId4" cstate="print">
+            <a:extLst>
+              <a:ext uri="{28A0092B-C50C-407E-A947-70E740481C1C}">
+                <a14:useLocalDpi xmlns:a14="http://schemas.microsoft.com/office/drawing/2010/main" val="0"/>
+              </a:ext>
+            </a:extLst>
+          </a:blip>
+          <a:stretch>
+            <a:fillRect/>
+          </a:stretch>
+        </p:blipFill>
+        <p:spPr>
+          <a:xfrm>
+            <a:off x="8654782" y="787809"/>
+            <a:ext cx="2803813" cy="1577145"/>
+          </a:xfrm>
+          <a:prstGeom prst="rect">
+            <a:avLst/>
+          </a:prstGeom>
+        </p:spPr>
+      </p:pic>
       <p:sp>
         <p:nvSpPr>
           <p:cNvPr id="4" name="Oval 3">
@@ -4106,16 +4234,13 @@
             <a:avLst/>
           </a:prstGeom>
           <a:blipFill dpi="0" rotWithShape="0">
-            <a:blip r:embed="rId2">
+            <a:blip r:embed="rId5">
               <a:extLst>
                 <a:ext uri="{BEBA8EAE-BF5A-486C-A8C5-ECC9F3942E4B}">
                   <a14:imgProps xmlns:a14="http://schemas.microsoft.com/office/drawing/2010/main">
-                    <a14:imgLayer r:embed="rId3">
+                    <a14:imgLayer r:embed="rId6">
                       <a14:imgEffect>
-                        <a14:sharpenSoften amount="-27000"/>
-                      </a14:imgEffect>
-                      <a14:imgEffect>
-                        <a14:brightnessContrast bright="-32000"/>
+                        <a14:sharpenSoften amount="-25000"/>
                       </a14:imgEffect>
                     </a14:imgLayer>
                   </a14:imgProps>
@@ -4153,134 +4278,6 @@
           </a:p>
         </p:txBody>
       </p:sp>
-      <p:pic>
-        <p:nvPicPr>
-          <p:cNvPr id="1028" name="Picture 4">
-            <a:extLst>
-              <a:ext uri="{FF2B5EF4-FFF2-40B4-BE49-F238E27FC236}">
-                <a16:creationId xmlns:a16="http://schemas.microsoft.com/office/drawing/2014/main" id="{66AE5B7D-3D8A-92BE-93FA-2D2FE267E84C}"/>
-              </a:ext>
-            </a:extLst>
-          </p:cNvPr>
-          <p:cNvPicPr>
-            <a:picLocks noChangeAspect="1" noChangeArrowheads="1"/>
-          </p:cNvPicPr>
-          <p:nvPr/>
-        </p:nvPicPr>
-        <p:blipFill>
-          <a:blip r:embed="rId4" cstate="print">
-            <a:extLst>
-              <a:ext uri="{28A0092B-C50C-407E-A947-70E740481C1C}">
-                <a14:useLocalDpi xmlns:a14="http://schemas.microsoft.com/office/drawing/2010/main" val="0"/>
-              </a:ext>
-            </a:extLst>
-          </a:blip>
-          <a:srcRect/>
-          <a:stretch>
-            <a:fillRect/>
-          </a:stretch>
-        </p:blipFill>
-        <p:spPr bwMode="auto">
-          <a:xfrm>
-            <a:off x="9358858" y="2714495"/>
-            <a:ext cx="1395664" cy="1531827"/>
-          </a:xfrm>
-          <a:prstGeom prst="rect">
-            <a:avLst/>
-          </a:prstGeom>
-          <a:noFill/>
-          <a:extLst>
-            <a:ext uri="{909E8E84-426E-40DD-AFC4-6F175D3DCCD1}">
-              <a14:hiddenFill xmlns:a14="http://schemas.microsoft.com/office/drawing/2010/main">
-                <a:solidFill>
-                  <a:srgbClr val="FFFFFF"/>
-                </a:solidFill>
-              </a14:hiddenFill>
-            </a:ext>
-          </a:extLst>
-        </p:spPr>
-      </p:pic>
-      <p:pic>
-        <p:nvPicPr>
-          <p:cNvPr id="1030" name="Picture 6">
-            <a:extLst>
-              <a:ext uri="{FF2B5EF4-FFF2-40B4-BE49-F238E27FC236}">
-                <a16:creationId xmlns:a16="http://schemas.microsoft.com/office/drawing/2014/main" id="{B6BCF2CA-120E-F608-F581-3E78C2E88191}"/>
-              </a:ext>
-            </a:extLst>
-          </p:cNvPr>
-          <p:cNvPicPr>
-            <a:picLocks noChangeAspect="1" noChangeArrowheads="1"/>
-          </p:cNvPicPr>
-          <p:nvPr/>
-        </p:nvPicPr>
-        <p:blipFill>
-          <a:blip r:embed="rId5" cstate="print">
-            <a:extLst>
-              <a:ext uri="{28A0092B-C50C-407E-A947-70E740481C1C}">
-                <a14:useLocalDpi xmlns:a14="http://schemas.microsoft.com/office/drawing/2010/main" val="0"/>
-              </a:ext>
-            </a:extLst>
-          </a:blip>
-          <a:srcRect/>
-          <a:stretch/>
-        </p:blipFill>
-        <p:spPr bwMode="auto">
-          <a:xfrm>
-            <a:off x="8716340" y="4773773"/>
-            <a:ext cx="2680699" cy="1061006"/>
-          </a:xfrm>
-          <a:prstGeom prst="rect">
-            <a:avLst/>
-          </a:prstGeom>
-          <a:noFill/>
-          <a:extLst>
-            <a:ext uri="{909E8E84-426E-40DD-AFC4-6F175D3DCCD1}">
-              <a14:hiddenFill xmlns:a14="http://schemas.microsoft.com/office/drawing/2010/main">
-                <a:solidFill>
-                  <a:srgbClr val="FFFFFF"/>
-                </a:solidFill>
-              </a14:hiddenFill>
-            </a:ext>
-          </a:extLst>
-        </p:spPr>
-      </p:pic>
-      <p:pic>
-        <p:nvPicPr>
-          <p:cNvPr id="6" name="Picture 5">
-            <a:extLst>
-              <a:ext uri="{FF2B5EF4-FFF2-40B4-BE49-F238E27FC236}">
-                <a16:creationId xmlns:a16="http://schemas.microsoft.com/office/drawing/2014/main" id="{39995E80-37DA-B78B-7337-1020F7BA20B7}"/>
-              </a:ext>
-            </a:extLst>
-          </p:cNvPr>
-          <p:cNvPicPr>
-            <a:picLocks noChangeAspect="1"/>
-          </p:cNvPicPr>
-          <p:nvPr/>
-        </p:nvPicPr>
-        <p:blipFill>
-          <a:blip r:embed="rId6" cstate="print">
-            <a:extLst>
-              <a:ext uri="{28A0092B-C50C-407E-A947-70E740481C1C}">
-                <a14:useLocalDpi xmlns:a14="http://schemas.microsoft.com/office/drawing/2010/main" val="0"/>
-              </a:ext>
-            </a:extLst>
-          </a:blip>
-          <a:stretch>
-            <a:fillRect/>
-          </a:stretch>
-        </p:blipFill>
-        <p:spPr>
-          <a:xfrm>
-            <a:off x="8654782" y="787809"/>
-            <a:ext cx="2803813" cy="1577145"/>
-          </a:xfrm>
-          <a:prstGeom prst="rect">
-            <a:avLst/>
-          </a:prstGeom>
-        </p:spPr>
-      </p:pic>
     </p:spTree>
     <p:extLst>
       <p:ext uri="{BB962C8B-B14F-4D97-AF65-F5344CB8AC3E}">
@@ -4343,7 +4340,7 @@
                 <a14:imgProps xmlns:a14="http://schemas.microsoft.com/office/drawing/2010/main">
                   <a14:imgLayer r:embed="rId3">
                     <a14:imgEffect>
-                      <a14:sharpenSoften amount="-27000"/>
+                      <a14:sharpenSoften amount="-35000"/>
                     </a14:imgEffect>
                   </a14:imgLayer>
                 </a14:imgProps>
@@ -4353,7 +4350,7 @@
               </a:ext>
             </a:extLst>
           </a:blip>
-          <a:srcRect l="14911" t="909" r="56271" b="-909"/>
+          <a:srcRect l="-1388" r="36113"/>
           <a:stretch/>
         </p:blipFill>
         <p:spPr>

</xml_diff>